<commit_message>
Updated Final Presentation with updated Bug Metrics
Updated Final Presentation with updated Bug Metrics
</commit_message>
<xml_diff>
--- a/presentations/Final Presentation.pptx
+++ b/presentations/Final Presentation.pptx
@@ -26296,7 +26296,7 @@
             <a:tbl>
               <a:tblPr>
                 <a:noFill/>
-                <a:tableStyleId>{02DE296B-2B48-4247-A9EF-52F887E97651}</a:tableStyleId>
+                <a:tableStyleId>{53DC84E1-39AF-4542-832B-0410D5E9119C}</a:tableStyleId>
               </a:tblPr>
               <a:tblGrid>
                 <a:gridCol w="928800"/>
@@ -27443,7 +27443,7 @@
             <a:tbl>
               <a:tblPr>
                 <a:noFill/>
-                <a:tableStyleId>{02DE296B-2B48-4247-A9EF-52F887E97651}</a:tableStyleId>
+                <a:tableStyleId>{53DC84E1-39AF-4542-832B-0410D5E9119C}</a:tableStyleId>
               </a:tblPr>
               <a:tblGrid>
                 <a:gridCol w="1308425"/>
@@ -28268,7 +28268,7 @@
             <a:tbl>
               <a:tblPr>
                 <a:noFill/>
-                <a:tableStyleId>{02DE296B-2B48-4247-A9EF-52F887E97651}</a:tableStyleId>
+                <a:tableStyleId>{53DC84E1-39AF-4542-832B-0410D5E9119C}</a:tableStyleId>
               </a:tblPr>
               <a:tblGrid>
                 <a:gridCol w="865225"/>
@@ -29283,7 +29283,7 @@
             <a:tbl>
               <a:tblPr>
                 <a:noFill/>
-                <a:tableStyleId>{02DE296B-2B48-4247-A9EF-52F887E97651}</a:tableStyleId>
+                <a:tableStyleId>{53DC84E1-39AF-4542-832B-0410D5E9119C}</a:tableStyleId>
               </a:tblPr>
               <a:tblGrid>
                 <a:gridCol w="888250"/>
@@ -30348,7 +30348,7 @@
         <p:spPr>
           <a:xfrm>
             <a:off x="4759325" y="1626925"/>
-            <a:ext cx="4229649" cy="2611803"/>
+            <a:ext cx="4229649" cy="2615327"/>
           </a:xfrm>
           <a:prstGeom prst="rect">
             <a:avLst/>
@@ -30590,7 +30590,7 @@
             <a:tbl>
               <a:tblPr>
                 <a:noFill/>
-                <a:tableStyleId>{02DE296B-2B48-4247-A9EF-52F887E97651}</a:tableStyleId>
+                <a:tableStyleId>{53DC84E1-39AF-4542-832B-0410D5E9119C}</a:tableStyleId>
               </a:tblPr>
               <a:tblGrid>
                 <a:gridCol w="3619500"/>
@@ -31315,6 +31315,9 @@
             </a:pPr>
             <a:r>
               <a:rPr b="1" lang="en-GB" sz="1800">
+                <a:solidFill>
+                  <a:srgbClr val="4A86E8"/>
+                </a:solidFill>
                 <a:latin typeface="Roboto Condensed"/>
                 <a:ea typeface="Roboto Condensed"/>
                 <a:cs typeface="Roboto Condensed"/>
@@ -31323,6 +31326,9 @@
               <a:t>Problems:</a:t>
             </a:r>
             <a:endParaRPr b="1" sz="1800">
+              <a:solidFill>
+                <a:srgbClr val="4A86E8"/>
+              </a:solidFill>
               <a:latin typeface="Roboto Condensed"/>
               <a:ea typeface="Roboto Condensed"/>
               <a:cs typeface="Roboto Condensed"/>
@@ -31338,23 +31344,23 @@
                 <a:spcPts val="0"/>
               </a:spcAft>
               <a:buSzPts val="1800"/>
-              <a:buFont typeface="Roboto Condensed Light"/>
+              <a:buFont typeface="Roboto Condensed"/>
               <a:buAutoNum type="arabicPeriod"/>
             </a:pPr>
             <a:r>
               <a:rPr lang="en-GB" sz="1800">
-                <a:latin typeface="Roboto Condensed Light"/>
-                <a:ea typeface="Roboto Condensed Light"/>
-                <a:cs typeface="Roboto Condensed Light"/>
-                <a:sym typeface="Roboto Condensed Light"/>
+                <a:latin typeface="Roboto Condensed"/>
+                <a:ea typeface="Roboto Condensed"/>
+                <a:cs typeface="Roboto Condensed"/>
+                <a:sym typeface="Roboto Condensed"/>
               </a:rPr>
               <a:t>Members filled up the sheet for bug log instead of bug metric, thus only 1 sheet was updated instead of both</a:t>
             </a:r>
             <a:endParaRPr sz="1800">
-              <a:latin typeface="Roboto Condensed Light"/>
-              <a:ea typeface="Roboto Condensed Light"/>
-              <a:cs typeface="Roboto Condensed Light"/>
-              <a:sym typeface="Roboto Condensed Light"/>
+              <a:latin typeface="Roboto Condensed"/>
+              <a:ea typeface="Roboto Condensed"/>
+              <a:cs typeface="Roboto Condensed"/>
+              <a:sym typeface="Roboto Condensed"/>
             </a:endParaRPr>
           </a:p>
           <a:p>
@@ -31366,23 +31372,23 @@
                 <a:spcPts val="0"/>
               </a:spcAft>
               <a:buSzPts val="1800"/>
-              <a:buFont typeface="Roboto Condensed Light"/>
+              <a:buFont typeface="Roboto Condensed"/>
               <a:buAutoNum type="arabicPeriod"/>
             </a:pPr>
             <a:r>
               <a:rPr lang="en-GB" sz="1800">
-                <a:latin typeface="Roboto Condensed Light"/>
-                <a:ea typeface="Roboto Condensed Light"/>
-                <a:cs typeface="Roboto Condensed Light"/>
-                <a:sym typeface="Roboto Condensed Light"/>
+                <a:latin typeface="Roboto Condensed"/>
+                <a:ea typeface="Roboto Condensed"/>
+                <a:cs typeface="Roboto Condensed"/>
+                <a:sym typeface="Roboto Condensed"/>
               </a:rPr>
               <a:t>Members sometimes forget to record bugs on the spot, thus we have to update the bug log very frequently</a:t>
             </a:r>
             <a:endParaRPr sz="1800">
-              <a:latin typeface="Roboto Condensed Light"/>
-              <a:ea typeface="Roboto Condensed Light"/>
-              <a:cs typeface="Roboto Condensed Light"/>
-              <a:sym typeface="Roboto Condensed Light"/>
+              <a:latin typeface="Roboto Condensed"/>
+              <a:ea typeface="Roboto Condensed"/>
+              <a:cs typeface="Roboto Condensed"/>
+              <a:sym typeface="Roboto Condensed"/>
             </a:endParaRPr>
           </a:p>
           <a:p>
@@ -31399,10 +31405,13 @@
               <a:t/>
             </a:r>
             <a:endParaRPr sz="1800">
-              <a:latin typeface="Roboto Condensed Light"/>
-              <a:ea typeface="Roboto Condensed Light"/>
-              <a:cs typeface="Roboto Condensed Light"/>
-              <a:sym typeface="Roboto Condensed Light"/>
+              <a:solidFill>
+                <a:schemeClr val="accent4"/>
+              </a:solidFill>
+              <a:latin typeface="Roboto Condensed"/>
+              <a:ea typeface="Roboto Condensed"/>
+              <a:cs typeface="Roboto Condensed"/>
+              <a:sym typeface="Roboto Condensed"/>
             </a:endParaRPr>
           </a:p>
           <a:p>
@@ -31417,6 +31426,9 @@
             </a:pPr>
             <a:r>
               <a:rPr b="1" lang="en-GB" sz="1800">
+                <a:solidFill>
+                  <a:schemeClr val="accent4"/>
+                </a:solidFill>
                 <a:latin typeface="Roboto Condensed"/>
                 <a:ea typeface="Roboto Condensed"/>
                 <a:cs typeface="Roboto Condensed"/>
@@ -31425,6 +31437,9 @@
               <a:t>Solution:</a:t>
             </a:r>
             <a:endParaRPr b="1" sz="1800">
+              <a:solidFill>
+                <a:schemeClr val="accent4"/>
+              </a:solidFill>
               <a:latin typeface="Roboto Condensed"/>
               <a:ea typeface="Roboto Condensed"/>
               <a:cs typeface="Roboto Condensed"/>
@@ -31440,23 +31455,23 @@
                 <a:spcPts val="0"/>
               </a:spcAft>
               <a:buSzPts val="1800"/>
-              <a:buFont typeface="Roboto Condensed Light"/>
+              <a:buFont typeface="Roboto Condensed"/>
               <a:buAutoNum type="arabicPeriod"/>
             </a:pPr>
             <a:r>
               <a:rPr lang="en-GB" sz="1800">
-                <a:latin typeface="Roboto Condensed Light"/>
-                <a:ea typeface="Roboto Condensed Light"/>
-                <a:cs typeface="Roboto Condensed Light"/>
-                <a:sym typeface="Roboto Condensed Light"/>
+                <a:latin typeface="Roboto Condensed"/>
+                <a:ea typeface="Roboto Condensed"/>
+                <a:cs typeface="Roboto Condensed"/>
+                <a:sym typeface="Roboto Condensed"/>
               </a:rPr>
               <a:t>At the end of every debugging session, members have to check if both sheets are filled. We also re-made the sheet to auto update from bug metric to bug log so we only have to fill one sheet out.</a:t>
             </a:r>
             <a:endParaRPr sz="1800">
-              <a:latin typeface="Roboto Condensed Light"/>
-              <a:ea typeface="Roboto Condensed Light"/>
-              <a:cs typeface="Roboto Condensed Light"/>
-              <a:sym typeface="Roboto Condensed Light"/>
+              <a:latin typeface="Roboto Condensed"/>
+              <a:ea typeface="Roboto Condensed"/>
+              <a:cs typeface="Roboto Condensed"/>
+              <a:sym typeface="Roboto Condensed"/>
             </a:endParaRPr>
           </a:p>
           <a:p>
@@ -31468,23 +31483,23 @@
                 <a:spcPts val="0"/>
               </a:spcAft>
               <a:buSzPts val="1800"/>
-              <a:buFont typeface="Roboto Condensed Light"/>
+              <a:buFont typeface="Roboto Condensed"/>
               <a:buAutoNum type="arabicPeriod"/>
             </a:pPr>
             <a:r>
               <a:rPr lang="en-GB" sz="1800">
-                <a:latin typeface="Roboto Condensed Light"/>
-                <a:ea typeface="Roboto Condensed Light"/>
-                <a:cs typeface="Roboto Condensed Light"/>
-                <a:sym typeface="Roboto Condensed Light"/>
+                <a:latin typeface="Roboto Condensed"/>
+                <a:ea typeface="Roboto Condensed"/>
+                <a:cs typeface="Roboto Condensed"/>
+                <a:sym typeface="Roboto Condensed"/>
               </a:rPr>
               <a:t>Remind members to record bugs every debugging or programming session</a:t>
             </a:r>
             <a:endParaRPr sz="1800">
-              <a:latin typeface="Roboto Condensed Light"/>
-              <a:ea typeface="Roboto Condensed Light"/>
-              <a:cs typeface="Roboto Condensed Light"/>
-              <a:sym typeface="Roboto Condensed Light"/>
+              <a:latin typeface="Roboto Condensed"/>
+              <a:ea typeface="Roboto Condensed"/>
+              <a:cs typeface="Roboto Condensed"/>
+              <a:sym typeface="Roboto Condensed"/>
             </a:endParaRPr>
           </a:p>
         </p:txBody>
@@ -32795,8 +32810,8 @@
         </p:blipFill>
         <p:spPr>
           <a:xfrm>
-            <a:off x="4564718" y="921762"/>
-            <a:ext cx="3579819" cy="1957925"/>
+            <a:off x="4572000" y="958850"/>
+            <a:ext cx="3551099" cy="1883750"/>
           </a:xfrm>
           <a:prstGeom prst="rect">
             <a:avLst/>
@@ -32823,8 +32838,8 @@
         </p:blipFill>
         <p:spPr>
           <a:xfrm>
-            <a:off x="786625" y="3033186"/>
-            <a:ext cx="3611126" cy="1957914"/>
+            <a:off x="786625" y="2995000"/>
+            <a:ext cx="3611125" cy="1939426"/>
           </a:xfrm>
           <a:prstGeom prst="rect">
             <a:avLst/>
@@ -32851,8 +32866,8 @@
         </p:blipFill>
         <p:spPr>
           <a:xfrm>
-            <a:off x="4550150" y="3014100"/>
-            <a:ext cx="3689416" cy="1957925"/>
+            <a:off x="4550150" y="2995000"/>
+            <a:ext cx="3611125" cy="1926365"/>
           </a:xfrm>
           <a:prstGeom prst="rect">
             <a:avLst/>
@@ -33163,6 +33178,9 @@
           <a:lstStyle/>
           <a:p>
             <a:pPr indent="-355600" lvl="0" marL="457200" rtl="0" algn="l">
+              <a:lnSpc>
+                <a:spcPct val="150000"/>
+              </a:lnSpc>
               <a:spcBef>
                 <a:spcPts val="0"/>
               </a:spcBef>
@@ -33191,6 +33209,9 @@
           </a:p>
           <a:p>
             <a:pPr indent="-355600" lvl="0" marL="457200" rtl="0" algn="l">
+              <a:lnSpc>
+                <a:spcPct val="150000"/>
+              </a:lnSpc>
               <a:spcBef>
                 <a:spcPts val="0"/>
               </a:spcBef>
@@ -33219,6 +33240,9 @@
           </a:p>
           <a:p>
             <a:pPr indent="-355600" lvl="0" marL="457200" rtl="0" algn="l">
+              <a:lnSpc>
+                <a:spcPct val="150000"/>
+              </a:lnSpc>
               <a:spcBef>
                 <a:spcPts val="0"/>
               </a:spcBef>
@@ -33236,7 +33260,7 @@
                 <a:cs typeface="Roboto Condensed"/>
                 <a:sym typeface="Roboto Condensed"/>
               </a:rPr>
-              <a:t>Regression testing with lots of test cases over and over again</a:t>
+              <a:t>Importance of regression testing (with lots of test cases)</a:t>
             </a:r>
             <a:endParaRPr sz="2000">
               <a:latin typeface="Roboto Condensed"/>
@@ -33247,6 +33271,9 @@
           </a:p>
           <a:p>
             <a:pPr indent="-355600" lvl="0" marL="457200" rtl="0" algn="l">
+              <a:lnSpc>
+                <a:spcPct val="150000"/>
+              </a:lnSpc>
               <a:spcBef>
                 <a:spcPts val="0"/>
               </a:spcBef>
@@ -33350,7 +33377,7 @@
         </p:nvSpPr>
         <p:spPr>
           <a:xfrm>
-            <a:off x="408825" y="1299050"/>
+            <a:off x="688375" y="1550625"/>
             <a:ext cx="7879500" cy="2973300"/>
           </a:xfrm>
           <a:prstGeom prst="rect">
@@ -33364,6 +33391,9 @@
           <a:lstStyle/>
           <a:p>
             <a:pPr indent="-355600" lvl="0" marL="457200" rtl="0" algn="l">
+              <a:lnSpc>
+                <a:spcPct val="150000"/>
+              </a:lnSpc>
               <a:spcBef>
                 <a:spcPts val="0"/>
               </a:spcBef>
@@ -33381,7 +33411,7 @@
                 <a:cs typeface="Roboto Condensed"/>
                 <a:sym typeface="Roboto Condensed"/>
               </a:rPr>
-              <a:t>Week 6, Leonard was sick and he is assigned as a coder. Thus, the rest of the coders have to cover his portion. </a:t>
+              <a:t>Week 6, Leonard was sick and he is assigned as a coder. Thus, the rest of the coders had to cover his portion. </a:t>
             </a:r>
             <a:endParaRPr sz="2000">
               <a:latin typeface="Roboto Condensed"/>
@@ -33392,6 +33422,9 @@
           </a:p>
           <a:p>
             <a:pPr indent="-355600" lvl="0" marL="457200" rtl="0" algn="l">
+              <a:lnSpc>
+                <a:spcPct val="150000"/>
+              </a:lnSpc>
               <a:spcBef>
                 <a:spcPts val="0"/>
               </a:spcBef>
@@ -33409,7 +33442,7 @@
                 <a:cs typeface="Roboto Condensed"/>
                 <a:sym typeface="Roboto Condensed"/>
               </a:rPr>
-              <a:t>We don’t understand JSON so we have to wait till TA session before we could utilise JSON Checkers.</a:t>
+              <a:t>We were unsure of JSON initially, so we waited till TA session before we could utilise JSON Checkers.</a:t>
             </a:r>
             <a:endParaRPr sz="2000">
               <a:latin typeface="Roboto Condensed"/>
@@ -33420,6 +33453,9 @@
           </a:p>
           <a:p>
             <a:pPr indent="-355600" lvl="0" marL="457200" rtl="0" algn="l">
+              <a:lnSpc>
+                <a:spcPct val="150000"/>
+              </a:lnSpc>
               <a:spcBef>
                 <a:spcPts val="0"/>
               </a:spcBef>
@@ -33437,7 +33473,7 @@
                 <a:cs typeface="Roboto Condensed"/>
                 <a:sym typeface="Roboto Condensed"/>
               </a:rPr>
-              <a:t>We are amicable people in an amicable team. So there are no conflicts, only amicable discussion</a:t>
+              <a:t>No major conflicts/issues</a:t>
             </a:r>
             <a:endParaRPr sz="2000">
               <a:latin typeface="Roboto Condensed"/>
@@ -33537,6 +33573,9 @@
           <a:lstStyle/>
           <a:p>
             <a:pPr indent="-355600" lvl="0" marL="457200" rtl="0" algn="l">
+              <a:lnSpc>
+                <a:spcPct val="150000"/>
+              </a:lnSpc>
               <a:spcBef>
                 <a:spcPts val="0"/>
               </a:spcBef>
@@ -33572,7 +33611,7 @@
                 <a:cs typeface="Roboto Condensed"/>
                 <a:sym typeface="Roboto Condensed"/>
               </a:rPr>
-              <a:t> strong at CSS but sometimes can be weak at PHP</a:t>
+              <a:t> strong at CSS but is weak at PHP</a:t>
             </a:r>
             <a:endParaRPr sz="2000">
               <a:latin typeface="Roboto Condensed"/>
@@ -33583,6 +33622,9 @@
           </a:p>
           <a:p>
             <a:pPr indent="-355600" lvl="0" marL="457200" rtl="0" algn="l">
+              <a:lnSpc>
+                <a:spcPct val="150000"/>
+              </a:lnSpc>
               <a:spcBef>
                 <a:spcPts val="0"/>
               </a:spcBef>
@@ -33611,6 +33653,9 @@
           </a:p>
           <a:p>
             <a:pPr indent="-355600" lvl="0" marL="457200" rtl="0" algn="l">
+              <a:lnSpc>
+                <a:spcPct val="150000"/>
+              </a:lnSpc>
               <a:spcBef>
                 <a:spcPts val="0"/>
               </a:spcBef>
@@ -33639,6 +33684,9 @@
           </a:p>
           <a:p>
             <a:pPr indent="-355600" lvl="0" marL="457200" rtl="0" algn="l">
+              <a:lnSpc>
+                <a:spcPct val="150000"/>
+              </a:lnSpc>
               <a:spcBef>
                 <a:spcPts val="0"/>
               </a:spcBef>
@@ -33656,7 +33704,7 @@
                 <a:cs typeface="Roboto Condensed"/>
                 <a:sym typeface="Roboto Condensed"/>
               </a:rPr>
-              <a:t>Yi Bing type only with her index fingers</a:t>
+              <a:t>Yi Bing types only with her index fingers</a:t>
             </a:r>
             <a:endParaRPr sz="2000">
               <a:latin typeface="Roboto Condensed"/>
@@ -33667,6 +33715,9 @@
           </a:p>
           <a:p>
             <a:pPr indent="-355600" lvl="0" marL="457200" rtl="0" algn="l">
+              <a:lnSpc>
+                <a:spcPct val="150000"/>
+              </a:lnSpc>
               <a:spcBef>
                 <a:spcPts val="0"/>
               </a:spcBef>
@@ -33729,7 +33780,7 @@
             </a:pPr>
             <a:r>
               <a:rPr lang="en-GB"/>
-              <a:t>Something Interesting about your Members</a:t>
+              <a:t>Something Interesting …...</a:t>
             </a:r>
             <a:endParaRPr/>
           </a:p>
@@ -38299,7 +38350,7 @@
             <a:tbl>
               <a:tblPr>
                 <a:noFill/>
-                <a:tableStyleId>{27CDDFD1-D73F-4740-907B-E8DB2722714D}</a:tableStyleId>
+                <a:tableStyleId>{16BA772C-9935-4CFD-83E4-763CF13EC429}</a:tableStyleId>
               </a:tblPr>
               <a:tblGrid>
                 <a:gridCol w="1472750"/>
@@ -39788,7 +39839,7 @@
             <a:tbl>
               <a:tblPr>
                 <a:noFill/>
-                <a:tableStyleId>{02DE296B-2B48-4247-A9EF-52F887E97651}</a:tableStyleId>
+                <a:tableStyleId>{53DC84E1-39AF-4542-832B-0410D5E9119C}</a:tableStyleId>
               </a:tblPr>
               <a:tblGrid>
                 <a:gridCol w="1055125"/>
@@ -40864,7 +40915,7 @@
             <a:tbl>
               <a:tblPr>
                 <a:noFill/>
-                <a:tableStyleId>{02DE296B-2B48-4247-A9EF-52F887E97651}</a:tableStyleId>
+                <a:tableStyleId>{53DC84E1-39AF-4542-832B-0410D5E9119C}</a:tableStyleId>
               </a:tblPr>
               <a:tblGrid>
                 <a:gridCol w="1105350"/>
@@ -42105,6 +42156,285 @@
 </file>
 
 <file path=ppt/theme/theme2.xml><?xml version="1.0" encoding="utf-8"?>
+<a:theme xmlns:a="http://schemas.openxmlformats.org/drawingml/2006/main" xmlns:r="http://schemas.openxmlformats.org/officeDocument/2006/relationships">
+  <a:themeElements>
+    <a:clrScheme name="Default">
+      <a:dk1>
+        <a:srgbClr val="000000"/>
+      </a:dk1>
+      <a:lt1>
+        <a:srgbClr val="FFFFFF"/>
+      </a:lt1>
+      <a:dk2>
+        <a:srgbClr val="158158"/>
+      </a:dk2>
+      <a:lt2>
+        <a:srgbClr val="F3F3F3"/>
+      </a:lt2>
+      <a:accent1>
+        <a:srgbClr val="058DC7"/>
+      </a:accent1>
+      <a:accent2>
+        <a:srgbClr val="50B432"/>
+      </a:accent2>
+      <a:accent3>
+        <a:srgbClr val="ED561B"/>
+      </a:accent3>
+      <a:accent4>
+        <a:srgbClr val="EDEF00"/>
+      </a:accent4>
+      <a:accent5>
+        <a:srgbClr val="24CBE5"/>
+      </a:accent5>
+      <a:accent6>
+        <a:srgbClr val="64E572"/>
+      </a:accent6>
+      <a:hlink>
+        <a:srgbClr val="2200CC"/>
+      </a:hlink>
+      <a:folHlink>
+        <a:srgbClr val="551A8B"/>
+      </a:folHlink>
+    </a:clrScheme>
+    <a:fontScheme name="Office">
+      <a:majorFont>
+        <a:latin typeface="Arial"/>
+        <a:ea typeface=""/>
+        <a:cs typeface=""/>
+        <a:font script="Jpan" typeface="ＭＳ Ｐゴシック"/>
+        <a:font script="Hang" typeface="맑은 고딕"/>
+        <a:font script="Hans" typeface="宋体"/>
+        <a:font script="Hant" typeface="新細明體"/>
+        <a:font script="Arab" typeface="Times New Roman"/>
+        <a:font script="Hebr" typeface="Times New Roman"/>
+        <a:font script="Thai" typeface="Angsana New"/>
+        <a:font script="Ethi" typeface="Nyala"/>
+        <a:font script="Beng" typeface="Vrinda"/>
+        <a:font script="Gujr" typeface="Shruti"/>
+        <a:font script="Khmr" typeface="MoolBoran"/>
+        <a:font script="Knda" typeface="Tunga"/>
+        <a:font script="Guru" typeface="Raavi"/>
+        <a:font script="Cans" typeface="Euphemia"/>
+        <a:font script="Cher" typeface="Plantagenet Cherokee"/>
+        <a:font script="Yiii" typeface="Microsoft Yi Baiti"/>
+        <a:font script="Tibt" typeface="Microsoft Himalaya"/>
+        <a:font script="Thaa" typeface="MV Boli"/>
+        <a:font script="Deva" typeface="Mangal"/>
+        <a:font script="Telu" typeface="Gautami"/>
+        <a:font script="Taml" typeface="Latha"/>
+        <a:font script="Syrc" typeface="Estrangelo Edessa"/>
+        <a:font script="Orya" typeface="Kalinga"/>
+        <a:font script="Mlym" typeface="Kartika"/>
+        <a:font script="Laoo" typeface="DokChampa"/>
+        <a:font script="Sinh" typeface="Iskoola Pota"/>
+        <a:font script="Mong" typeface="Mongolian Baiti"/>
+        <a:font script="Viet" typeface="Times New Roman"/>
+        <a:font script="Uigh" typeface="Microsoft Uighur"/>
+        <a:font script="Geor" typeface="Sylfaen"/>
+      </a:majorFont>
+      <a:minorFont>
+        <a:latin typeface="Arial"/>
+        <a:ea typeface=""/>
+        <a:cs typeface=""/>
+        <a:font script="Jpan" typeface="ＭＳ Ｐゴシック"/>
+        <a:font script="Hang" typeface="맑은 고딕"/>
+        <a:font script="Hans" typeface="宋体"/>
+        <a:font script="Hant" typeface="新細明體"/>
+        <a:font script="Arab" typeface="Arial"/>
+        <a:font script="Hebr" typeface="Arial"/>
+        <a:font script="Thai" typeface="Cordia New"/>
+        <a:font script="Ethi" typeface="Nyala"/>
+        <a:font script="Beng" typeface="Vrinda"/>
+        <a:font script="Gujr" typeface="Shruti"/>
+        <a:font script="Khmr" typeface="DaunPenh"/>
+        <a:font script="Knda" typeface="Tunga"/>
+        <a:font script="Guru" typeface="Raavi"/>
+        <a:font script="Cans" typeface="Euphemia"/>
+        <a:font script="Cher" typeface="Plantagenet Cherokee"/>
+        <a:font script="Yiii" typeface="Microsoft Yi Baiti"/>
+        <a:font script="Tibt" typeface="Microsoft Himalaya"/>
+        <a:font script="Thaa" typeface="MV Boli"/>
+        <a:font script="Deva" typeface="Mangal"/>
+        <a:font script="Telu" typeface="Gautami"/>
+        <a:font script="Taml" typeface="Latha"/>
+        <a:font script="Syrc" typeface="Estrangelo Edessa"/>
+        <a:font script="Orya" typeface="Kalinga"/>
+        <a:font script="Mlym" typeface="Kartika"/>
+        <a:font script="Laoo" typeface="DokChampa"/>
+        <a:font script="Sinh" typeface="Iskoola Pota"/>
+        <a:font script="Mong" typeface="Mongolian Baiti"/>
+        <a:font script="Viet" typeface="Arial"/>
+        <a:font script="Uigh" typeface="Microsoft Uighur"/>
+        <a:font script="Geor" typeface="Sylfaen"/>
+      </a:minorFont>
+    </a:fontScheme>
+    <a:fmtScheme name="Office">
+      <a:fillStyleLst>
+        <a:solidFill>
+          <a:schemeClr val="phClr"/>
+        </a:solidFill>
+        <a:gradFill rotWithShape="1">
+          <a:gsLst>
+            <a:gs pos="0">
+              <a:schemeClr val="phClr">
+                <a:tint val="50000"/>
+                <a:satMod val="300000"/>
+              </a:schemeClr>
+            </a:gs>
+            <a:gs pos="35000">
+              <a:schemeClr val="phClr">
+                <a:tint val="37000"/>
+                <a:satMod val="300000"/>
+              </a:schemeClr>
+            </a:gs>
+            <a:gs pos="100000">
+              <a:schemeClr val="phClr">
+                <a:tint val="15000"/>
+                <a:satMod val="350000"/>
+              </a:schemeClr>
+            </a:gs>
+          </a:gsLst>
+          <a:lin ang="16200000" scaled="1"/>
+        </a:gradFill>
+        <a:gradFill rotWithShape="1">
+          <a:gsLst>
+            <a:gs pos="0">
+              <a:schemeClr val="phClr">
+                <a:tint val="100000"/>
+                <a:shade val="100000"/>
+                <a:satMod val="130000"/>
+              </a:schemeClr>
+            </a:gs>
+            <a:gs pos="100000">
+              <a:schemeClr val="phClr">
+                <a:tint val="50000"/>
+                <a:shade val="100000"/>
+                <a:satMod val="350000"/>
+              </a:schemeClr>
+            </a:gs>
+          </a:gsLst>
+          <a:lin ang="16200000" scaled="0"/>
+        </a:gradFill>
+      </a:fillStyleLst>
+      <a:lnStyleLst>
+        <a:ln w="9525" cap="flat" cmpd="sng" algn="ctr">
+          <a:solidFill>
+            <a:schemeClr val="phClr">
+              <a:shade val="95000"/>
+              <a:satMod val="105000"/>
+            </a:schemeClr>
+          </a:solidFill>
+          <a:prstDash val="solid"/>
+        </a:ln>
+        <a:ln w="25400" cap="flat" cmpd="sng" algn="ctr">
+          <a:solidFill>
+            <a:schemeClr val="phClr"/>
+          </a:solidFill>
+          <a:prstDash val="solid"/>
+        </a:ln>
+        <a:ln w="38100" cap="flat" cmpd="sng" algn="ctr">
+          <a:solidFill>
+            <a:schemeClr val="phClr"/>
+          </a:solidFill>
+          <a:prstDash val="solid"/>
+        </a:ln>
+      </a:lnStyleLst>
+      <a:effectStyleLst>
+        <a:effectStyle>
+          <a:effectLst>
+            <a:outerShdw blurRad="40000" dist="20000" dir="5400000" rotWithShape="0">
+              <a:srgbClr val="000000">
+                <a:alpha val="38000"/>
+              </a:srgbClr>
+            </a:outerShdw>
+          </a:effectLst>
+        </a:effectStyle>
+        <a:effectStyle>
+          <a:effectLst>
+            <a:outerShdw blurRad="40000" dist="23000" dir="5400000" rotWithShape="0">
+              <a:srgbClr val="000000">
+                <a:alpha val="35000"/>
+              </a:srgbClr>
+            </a:outerShdw>
+          </a:effectLst>
+        </a:effectStyle>
+        <a:effectStyle>
+          <a:effectLst>
+            <a:outerShdw blurRad="40000" dist="23000" dir="5400000" rotWithShape="0">
+              <a:srgbClr val="000000">
+                <a:alpha val="35000"/>
+              </a:srgbClr>
+            </a:outerShdw>
+          </a:effectLst>
+          <a:scene3d>
+            <a:camera prst="orthographicFront">
+              <a:rot lat="0" lon="0" rev="0"/>
+            </a:camera>
+            <a:lightRig rig="threePt" dir="t">
+              <a:rot lat="0" lon="0" rev="1200000"/>
+            </a:lightRig>
+          </a:scene3d>
+          <a:sp3d>
+            <a:bevelT w="63500" h="25400"/>
+          </a:sp3d>
+        </a:effectStyle>
+      </a:effectStyleLst>
+      <a:bgFillStyleLst>
+        <a:solidFill>
+          <a:schemeClr val="phClr"/>
+        </a:solidFill>
+        <a:gradFill rotWithShape="1">
+          <a:gsLst>
+            <a:gs pos="0">
+              <a:schemeClr val="phClr">
+                <a:tint val="40000"/>
+                <a:satMod val="350000"/>
+              </a:schemeClr>
+            </a:gs>
+            <a:gs pos="40000">
+              <a:schemeClr val="phClr">
+                <a:tint val="45000"/>
+                <a:shade val="99000"/>
+                <a:satMod val="350000"/>
+              </a:schemeClr>
+            </a:gs>
+            <a:gs pos="100000">
+              <a:schemeClr val="phClr">
+                <a:shade val="20000"/>
+                <a:satMod val="255000"/>
+              </a:schemeClr>
+            </a:gs>
+          </a:gsLst>
+          <a:path path="circle">
+            <a:fillToRect l="50000" t="-80000" r="50000" b="180000"/>
+          </a:path>
+        </a:gradFill>
+        <a:gradFill rotWithShape="1">
+          <a:gsLst>
+            <a:gs pos="0">
+              <a:schemeClr val="phClr">
+                <a:tint val="80000"/>
+                <a:satMod val="300000"/>
+              </a:schemeClr>
+            </a:gs>
+            <a:gs pos="100000">
+              <a:schemeClr val="phClr">
+                <a:shade val="30000"/>
+                <a:satMod val="200000"/>
+              </a:schemeClr>
+            </a:gs>
+          </a:gsLst>
+          <a:path path="circle">
+            <a:fillToRect l="50000" t="50000" r="50000" b="50000"/>
+          </a:path>
+        </a:gradFill>
+      </a:bgFillStyleLst>
+    </a:fmtScheme>
+  </a:themeElements>
+</a:theme>
+</file>
+
+<file path=ppt/theme/theme3.xml><?xml version="1.0" encoding="utf-8"?>
 <a:theme xmlns:a="http://schemas.openxmlformats.org/drawingml/2006/main" xmlns:r="http://schemas.openxmlformats.org/officeDocument/2006/relationships" name="Simple Light">
   <a:themeElements>
     <a:clrScheme name="Simple Light">
@@ -42381,283 +42711,4 @@
     </a:fmtScheme>
   </a:themeElements>
 </a:theme>
-</file>
-
-<file path=ppt/theme/theme3.xml><?xml version="1.0" encoding="utf-8"?>
-<a:theme xmlns:a="http://schemas.openxmlformats.org/drawingml/2006/main" xmlns:r="http://schemas.openxmlformats.org/officeDocument/2006/relationships">
-  <a:themeElements>
-    <a:clrScheme name="Default">
-      <a:dk1>
-        <a:srgbClr val="000000"/>
-      </a:dk1>
-      <a:lt1>
-        <a:srgbClr val="FFFFFF"/>
-      </a:lt1>
-      <a:dk2>
-        <a:srgbClr val="158158"/>
-      </a:dk2>
-      <a:lt2>
-        <a:srgbClr val="F3F3F3"/>
-      </a:lt2>
-      <a:accent1>
-        <a:srgbClr val="058DC7"/>
-      </a:accent1>
-      <a:accent2>
-        <a:srgbClr val="50B432"/>
-      </a:accent2>
-      <a:accent3>
-        <a:srgbClr val="ED561B"/>
-      </a:accent3>
-      <a:accent4>
-        <a:srgbClr val="EDEF00"/>
-      </a:accent4>
-      <a:accent5>
-        <a:srgbClr val="24CBE5"/>
-      </a:accent5>
-      <a:accent6>
-        <a:srgbClr val="64E572"/>
-      </a:accent6>
-      <a:hlink>
-        <a:srgbClr val="2200CC"/>
-      </a:hlink>
-      <a:folHlink>
-        <a:srgbClr val="551A8B"/>
-      </a:folHlink>
-    </a:clrScheme>
-    <a:fontScheme name="Office">
-      <a:majorFont>
-        <a:latin typeface="Arial"/>
-        <a:ea typeface=""/>
-        <a:cs typeface=""/>
-        <a:font script="Jpan" typeface="ＭＳ Ｐゴシック"/>
-        <a:font script="Hang" typeface="맑은 고딕"/>
-        <a:font script="Hans" typeface="宋体"/>
-        <a:font script="Hant" typeface="新細明體"/>
-        <a:font script="Arab" typeface="Times New Roman"/>
-        <a:font script="Hebr" typeface="Times New Roman"/>
-        <a:font script="Thai" typeface="Angsana New"/>
-        <a:font script="Ethi" typeface="Nyala"/>
-        <a:font script="Beng" typeface="Vrinda"/>
-        <a:font script="Gujr" typeface="Shruti"/>
-        <a:font script="Khmr" typeface="MoolBoran"/>
-        <a:font script="Knda" typeface="Tunga"/>
-        <a:font script="Guru" typeface="Raavi"/>
-        <a:font script="Cans" typeface="Euphemia"/>
-        <a:font script="Cher" typeface="Plantagenet Cherokee"/>
-        <a:font script="Yiii" typeface="Microsoft Yi Baiti"/>
-        <a:font script="Tibt" typeface="Microsoft Himalaya"/>
-        <a:font script="Thaa" typeface="MV Boli"/>
-        <a:font script="Deva" typeface="Mangal"/>
-        <a:font script="Telu" typeface="Gautami"/>
-        <a:font script="Taml" typeface="Latha"/>
-        <a:font script="Syrc" typeface="Estrangelo Edessa"/>
-        <a:font script="Orya" typeface="Kalinga"/>
-        <a:font script="Mlym" typeface="Kartika"/>
-        <a:font script="Laoo" typeface="DokChampa"/>
-        <a:font script="Sinh" typeface="Iskoola Pota"/>
-        <a:font script="Mong" typeface="Mongolian Baiti"/>
-        <a:font script="Viet" typeface="Times New Roman"/>
-        <a:font script="Uigh" typeface="Microsoft Uighur"/>
-        <a:font script="Geor" typeface="Sylfaen"/>
-      </a:majorFont>
-      <a:minorFont>
-        <a:latin typeface="Arial"/>
-        <a:ea typeface=""/>
-        <a:cs typeface=""/>
-        <a:font script="Jpan" typeface="ＭＳ Ｐゴシック"/>
-        <a:font script="Hang" typeface="맑은 고딕"/>
-        <a:font script="Hans" typeface="宋体"/>
-        <a:font script="Hant" typeface="新細明體"/>
-        <a:font script="Arab" typeface="Arial"/>
-        <a:font script="Hebr" typeface="Arial"/>
-        <a:font script="Thai" typeface="Cordia New"/>
-        <a:font script="Ethi" typeface="Nyala"/>
-        <a:font script="Beng" typeface="Vrinda"/>
-        <a:font script="Gujr" typeface="Shruti"/>
-        <a:font script="Khmr" typeface="DaunPenh"/>
-        <a:font script="Knda" typeface="Tunga"/>
-        <a:font script="Guru" typeface="Raavi"/>
-        <a:font script="Cans" typeface="Euphemia"/>
-        <a:font script="Cher" typeface="Plantagenet Cherokee"/>
-        <a:font script="Yiii" typeface="Microsoft Yi Baiti"/>
-        <a:font script="Tibt" typeface="Microsoft Himalaya"/>
-        <a:font script="Thaa" typeface="MV Boli"/>
-        <a:font script="Deva" typeface="Mangal"/>
-        <a:font script="Telu" typeface="Gautami"/>
-        <a:font script="Taml" typeface="Latha"/>
-        <a:font script="Syrc" typeface="Estrangelo Edessa"/>
-        <a:font script="Orya" typeface="Kalinga"/>
-        <a:font script="Mlym" typeface="Kartika"/>
-        <a:font script="Laoo" typeface="DokChampa"/>
-        <a:font script="Sinh" typeface="Iskoola Pota"/>
-        <a:font script="Mong" typeface="Mongolian Baiti"/>
-        <a:font script="Viet" typeface="Arial"/>
-        <a:font script="Uigh" typeface="Microsoft Uighur"/>
-        <a:font script="Geor" typeface="Sylfaen"/>
-      </a:minorFont>
-    </a:fontScheme>
-    <a:fmtScheme name="Office">
-      <a:fillStyleLst>
-        <a:solidFill>
-          <a:schemeClr val="phClr"/>
-        </a:solidFill>
-        <a:gradFill rotWithShape="1">
-          <a:gsLst>
-            <a:gs pos="0">
-              <a:schemeClr val="phClr">
-                <a:tint val="50000"/>
-                <a:satMod val="300000"/>
-              </a:schemeClr>
-            </a:gs>
-            <a:gs pos="35000">
-              <a:schemeClr val="phClr">
-                <a:tint val="37000"/>
-                <a:satMod val="300000"/>
-              </a:schemeClr>
-            </a:gs>
-            <a:gs pos="100000">
-              <a:schemeClr val="phClr">
-                <a:tint val="15000"/>
-                <a:satMod val="350000"/>
-              </a:schemeClr>
-            </a:gs>
-          </a:gsLst>
-          <a:lin ang="16200000" scaled="1"/>
-        </a:gradFill>
-        <a:gradFill rotWithShape="1">
-          <a:gsLst>
-            <a:gs pos="0">
-              <a:schemeClr val="phClr">
-                <a:tint val="100000"/>
-                <a:shade val="100000"/>
-                <a:satMod val="130000"/>
-              </a:schemeClr>
-            </a:gs>
-            <a:gs pos="100000">
-              <a:schemeClr val="phClr">
-                <a:tint val="50000"/>
-                <a:shade val="100000"/>
-                <a:satMod val="350000"/>
-              </a:schemeClr>
-            </a:gs>
-          </a:gsLst>
-          <a:lin ang="16200000" scaled="0"/>
-        </a:gradFill>
-      </a:fillStyleLst>
-      <a:lnStyleLst>
-        <a:ln w="9525" cap="flat" cmpd="sng" algn="ctr">
-          <a:solidFill>
-            <a:schemeClr val="phClr">
-              <a:shade val="95000"/>
-              <a:satMod val="105000"/>
-            </a:schemeClr>
-          </a:solidFill>
-          <a:prstDash val="solid"/>
-        </a:ln>
-        <a:ln w="25400" cap="flat" cmpd="sng" algn="ctr">
-          <a:solidFill>
-            <a:schemeClr val="phClr"/>
-          </a:solidFill>
-          <a:prstDash val="solid"/>
-        </a:ln>
-        <a:ln w="38100" cap="flat" cmpd="sng" algn="ctr">
-          <a:solidFill>
-            <a:schemeClr val="phClr"/>
-          </a:solidFill>
-          <a:prstDash val="solid"/>
-        </a:ln>
-      </a:lnStyleLst>
-      <a:effectStyleLst>
-        <a:effectStyle>
-          <a:effectLst>
-            <a:outerShdw blurRad="40000" dist="20000" dir="5400000" rotWithShape="0">
-              <a:srgbClr val="000000">
-                <a:alpha val="38000"/>
-              </a:srgbClr>
-            </a:outerShdw>
-          </a:effectLst>
-        </a:effectStyle>
-        <a:effectStyle>
-          <a:effectLst>
-            <a:outerShdw blurRad="40000" dist="23000" dir="5400000" rotWithShape="0">
-              <a:srgbClr val="000000">
-                <a:alpha val="35000"/>
-              </a:srgbClr>
-            </a:outerShdw>
-          </a:effectLst>
-        </a:effectStyle>
-        <a:effectStyle>
-          <a:effectLst>
-            <a:outerShdw blurRad="40000" dist="23000" dir="5400000" rotWithShape="0">
-              <a:srgbClr val="000000">
-                <a:alpha val="35000"/>
-              </a:srgbClr>
-            </a:outerShdw>
-          </a:effectLst>
-          <a:scene3d>
-            <a:camera prst="orthographicFront">
-              <a:rot lat="0" lon="0" rev="0"/>
-            </a:camera>
-            <a:lightRig rig="threePt" dir="t">
-              <a:rot lat="0" lon="0" rev="1200000"/>
-            </a:lightRig>
-          </a:scene3d>
-          <a:sp3d>
-            <a:bevelT w="63500" h="25400"/>
-          </a:sp3d>
-        </a:effectStyle>
-      </a:effectStyleLst>
-      <a:bgFillStyleLst>
-        <a:solidFill>
-          <a:schemeClr val="phClr"/>
-        </a:solidFill>
-        <a:gradFill rotWithShape="1">
-          <a:gsLst>
-            <a:gs pos="0">
-              <a:schemeClr val="phClr">
-                <a:tint val="40000"/>
-                <a:satMod val="350000"/>
-              </a:schemeClr>
-            </a:gs>
-            <a:gs pos="40000">
-              <a:schemeClr val="phClr">
-                <a:tint val="45000"/>
-                <a:shade val="99000"/>
-                <a:satMod val="350000"/>
-              </a:schemeClr>
-            </a:gs>
-            <a:gs pos="100000">
-              <a:schemeClr val="phClr">
-                <a:shade val="20000"/>
-                <a:satMod val="255000"/>
-              </a:schemeClr>
-            </a:gs>
-          </a:gsLst>
-          <a:path path="circle">
-            <a:fillToRect l="50000" t="-80000" r="50000" b="180000"/>
-          </a:path>
-        </a:gradFill>
-        <a:gradFill rotWithShape="1">
-          <a:gsLst>
-            <a:gs pos="0">
-              <a:schemeClr val="phClr">
-                <a:tint val="80000"/>
-                <a:satMod val="300000"/>
-              </a:schemeClr>
-            </a:gs>
-            <a:gs pos="100000">
-              <a:schemeClr val="phClr">
-                <a:shade val="30000"/>
-                <a:satMod val="200000"/>
-              </a:schemeClr>
-            </a:gs>
-          </a:gsLst>
-          <a:path path="circle">
-            <a:fillToRect l="50000" t="50000" r="50000" b="50000"/>
-          </a:path>
-        </a:gradFill>
-      </a:bgFillStyleLst>
-    </a:fmtScheme>
-  </a:themeElements>
-</a:theme>
 </file>
</xml_diff>